<commit_message>
Adding gherkins for log in and create a client
</commit_message>
<xml_diff>
--- a/SpecFlowTest.Tests/UA3 - log in to the system/UA3 - log in to the system.pptx
+++ b/SpecFlowTest.Tests/UA3 - log in to the system/UA3 - log in to the system.pptx
@@ -25414,7 +25414,6 @@
   <p:tag name="SYNCTITLEDIRECTION" val="StepsToSlides"/>
   <p:tag name="SYNCAFLINKS" val="True"/>
   <p:tag name="SELECTEDFOLDER" val="Y:\IT\New FXCRM System\PowerStory Documents"/>
-  <p:tag name="TFSSETTINGS" val="&lt;?xml version=&quot;1.0&quot; encoding=&quot;utf-16&quot;?&gt;&lt;TfsSettings xmlns:i=&quot;http://www.w3.org/2001/XMLSchema-instance&quot; xmlns=&quot;http://schemas.datacontract.org/2004/07/SD.REQC.Editors.UseCase.Models&quot;&gt;&lt;AttachedItems i:nil=&quot;true&quot; /&gt;&lt;DefaultCollectionId&gt;5f5fe6c9-46ca-4477-970c-8b5796b04f7c&lt;/DefaultCollectionId&gt;&lt;DefaultServerUri&gt;https://cornhillfx.visualstudio.com/&lt;/DefaultServerUri&gt;&lt;Projects&gt;&lt;TfsProject&gt;&lt;Name&gt;TestingPowerStory&lt;/Name&gt;&lt;Uri&gt;vstfs:///Classification/TeamProject/ca5e912f-f221-46b3-9473-8bfd90cbc94b&lt;/Uri&gt;&lt;/TfsProject&gt;&lt;/Projects&gt;&lt;Uri&gt;https://cornhillfx.visualstudio.com/defaultcollection&lt;/Uri&gt;&lt;/TfsSettings&gt;"/>
   <p:tag name="TREEVIEWMODE" val="True"/>
   <p:tag name="TESTPLANID" val="10"/>
   <p:tag name="USERDEFINITION" val="&lt;user&gt;"/>
@@ -25423,8 +25422,9 @@
   <p:tag name="SHOWUIMOCKUPEDITOR" val="True"/>
   <p:tag name="SMARTUIID" val="c986645d-ba23-4fd9-bf28-aac17a52880c"/>
   <p:tag name="SHOWSMARTUICONTROLEDITOR" val="True"/>
-  <p:tag name="ID" val="4c6f87e4-2d30-4371-ba7a-10ce8745ea28"/>
+  <p:tag name="ID" val="5241e983-abb3-4b73-bb78-20e914025cb3"/>
   <p:tag name="SHOWSTEPSEDITOR" val="True"/>
+  <p:tag name="TFSSETTINGS" val="&lt;?xml version=&quot;1.0&quot; encoding=&quot;utf-16&quot;?&gt;&lt;TfsSettings xmlns:i=&quot;http://www.w3.org/2001/XMLSchema-instance&quot; xmlns=&quot;http://schemas.datacontract.org/2004/07/SD.REQC.Editors.UseCase.Models&quot;&gt;&lt;AttachedItems&gt;&lt;AttachedItem&gt;&lt;Id&gt;25&lt;/Id&gt;&lt;IterationPath&gt;TestingSpecFlow&lt;/IterationPath&gt;&lt;Project&gt;TestingSpecFlow&lt;/Project&gt;&lt;Title&gt;US1 - login with a username and password&lt;/Title&gt;&lt;/AttachedItem&gt;&lt;AttachedItem&gt;&lt;Id&gt;26&lt;/Id&gt;&lt;IterationPath&gt;TestingSpecFlow&lt;/IterationPath&gt;&lt;Project&gt;TestingSpecFlow&lt;/Project&gt;&lt;Title&gt;US13 - have my login details remembered by the system&lt;/Title&gt;&lt;/AttachedItem&gt;&lt;AttachedItem&gt;&lt;Id&gt;36&lt;/Id&gt;&lt;IterationPath&gt;TestingSpecFlow&lt;/IterationPath&gt;&lt;Project&gt;TestingSpecFlow&lt;/Project&gt;&lt;Title&gt;UA3 - log in to the system&lt;/Title&gt;&lt;/AttachedItem&gt;&lt;/AttachedItems&gt;&lt;DefaultCollectionId&gt;5f5fe6c9-46ca-4477-970c-8b5796b04f7c&lt;/DefaultCollectionId&gt;&lt;DefaultServerUri&gt;https://cornhillfx.visualstudio.com/&lt;/DefaultServerUri&gt;&lt;Projects&gt;&lt;TfsProject&gt;&lt;Name&gt;TestingSpecFlow&lt;/Name&gt;&lt;Uri&gt;vstfs:///Classification/TeamProject/c06d088b-2cca-4e70-8ba9-7af7f9bb3445&lt;/Uri&gt;&lt;/TfsProject&gt;&lt;/Projects&gt;&lt;Uri&gt;https://cornhillfx.visualstudio.com/defaultcollection&lt;/Uri&gt;&lt;/TfsSettings&gt;"/>
 </p:tagLst>
 </file>
 

</xml_diff>